<commit_message>
Minor modifications to diagram of the Monti framework of approaches to community
</commit_message>
<xml_diff>
--- a/Reference/SOC5060_Framework_Monti_MakingCommunity_2019v00.pptx
+++ b/Reference/SOC5060_Framework_Monti_MakingCommunity_2019v00.pptx
@@ -241,7 +241,7 @@
           <a:p>
             <a:fld id="{40CF262A-BA9E-4FD4-B7A4-17D33C6E7493}" type="datetimeFigureOut">
               <a:rPr lang="en-US" smtClean="0"/>
-              <a:t>10/3/2019</a:t>
+              <a:t>10/4/2019</a:t>
             </a:fld>
             <a:endParaRPr lang="en-US"/>
           </a:p>
@@ -409,7 +409,7 @@
           <a:p>
             <a:fld id="{40CF262A-BA9E-4FD4-B7A4-17D33C6E7493}" type="datetimeFigureOut">
               <a:rPr lang="en-US" smtClean="0"/>
-              <a:t>10/3/2019</a:t>
+              <a:t>10/4/2019</a:t>
             </a:fld>
             <a:endParaRPr lang="en-US"/>
           </a:p>
@@ -587,7 +587,7 @@
           <a:p>
             <a:fld id="{40CF262A-BA9E-4FD4-B7A4-17D33C6E7493}" type="datetimeFigureOut">
               <a:rPr lang="en-US" smtClean="0"/>
-              <a:t>10/3/2019</a:t>
+              <a:t>10/4/2019</a:t>
             </a:fld>
             <a:endParaRPr lang="en-US"/>
           </a:p>
@@ -755,7 +755,7 @@
           <a:p>
             <a:fld id="{40CF262A-BA9E-4FD4-B7A4-17D33C6E7493}" type="datetimeFigureOut">
               <a:rPr lang="en-US" smtClean="0"/>
-              <a:t>10/3/2019</a:t>
+              <a:t>10/4/2019</a:t>
             </a:fld>
             <a:endParaRPr lang="en-US"/>
           </a:p>
@@ -1000,7 +1000,7 @@
           <a:p>
             <a:fld id="{40CF262A-BA9E-4FD4-B7A4-17D33C6E7493}" type="datetimeFigureOut">
               <a:rPr lang="en-US" smtClean="0"/>
-              <a:t>10/3/2019</a:t>
+              <a:t>10/4/2019</a:t>
             </a:fld>
             <a:endParaRPr lang="en-US"/>
           </a:p>
@@ -1229,7 +1229,7 @@
           <a:p>
             <a:fld id="{40CF262A-BA9E-4FD4-B7A4-17D33C6E7493}" type="datetimeFigureOut">
               <a:rPr lang="en-US" smtClean="0"/>
-              <a:t>10/3/2019</a:t>
+              <a:t>10/4/2019</a:t>
             </a:fld>
             <a:endParaRPr lang="en-US"/>
           </a:p>
@@ -1593,7 +1593,7 @@
           <a:p>
             <a:fld id="{40CF262A-BA9E-4FD4-B7A4-17D33C6E7493}" type="datetimeFigureOut">
               <a:rPr lang="en-US" smtClean="0"/>
-              <a:t>10/3/2019</a:t>
+              <a:t>10/4/2019</a:t>
             </a:fld>
             <a:endParaRPr lang="en-US"/>
           </a:p>
@@ -1710,7 +1710,7 @@
           <a:p>
             <a:fld id="{40CF262A-BA9E-4FD4-B7A4-17D33C6E7493}" type="datetimeFigureOut">
               <a:rPr lang="en-US" smtClean="0"/>
-              <a:t>10/3/2019</a:t>
+              <a:t>10/4/2019</a:t>
             </a:fld>
             <a:endParaRPr lang="en-US"/>
           </a:p>
@@ -1805,7 +1805,7 @@
           <a:p>
             <a:fld id="{40CF262A-BA9E-4FD4-B7A4-17D33C6E7493}" type="datetimeFigureOut">
               <a:rPr lang="en-US" smtClean="0"/>
-              <a:t>10/3/2019</a:t>
+              <a:t>10/4/2019</a:t>
             </a:fld>
             <a:endParaRPr lang="en-US"/>
           </a:p>
@@ -2080,7 +2080,7 @@
           <a:p>
             <a:fld id="{40CF262A-BA9E-4FD4-B7A4-17D33C6E7493}" type="datetimeFigureOut">
               <a:rPr lang="en-US" smtClean="0"/>
-              <a:t>10/3/2019</a:t>
+              <a:t>10/4/2019</a:t>
             </a:fld>
             <a:endParaRPr lang="en-US"/>
           </a:p>
@@ -2332,7 +2332,7 @@
           <a:p>
             <a:fld id="{40CF262A-BA9E-4FD4-B7A4-17D33C6E7493}" type="datetimeFigureOut">
               <a:rPr lang="en-US" smtClean="0"/>
-              <a:t>10/3/2019</a:t>
+              <a:t>10/4/2019</a:t>
             </a:fld>
             <a:endParaRPr lang="en-US"/>
           </a:p>
@@ -2543,7 +2543,7 @@
           <a:p>
             <a:fld id="{40CF262A-BA9E-4FD4-B7A4-17D33C6E7493}" type="datetimeFigureOut">
               <a:rPr lang="en-US" smtClean="0"/>
-              <a:t>10/3/2019</a:t>
+              <a:t>10/4/2019</a:t>
             </a:fld>
             <a:endParaRPr lang="en-US"/>
           </a:p>
@@ -3180,7 +3180,7 @@
         </p:nvSpPr>
         <p:spPr>
           <a:xfrm>
-            <a:off x="3238671" y="3707125"/>
+            <a:off x="3255449" y="3765848"/>
             <a:ext cx="1371600" cy="1371600"/>
           </a:xfrm>
           <a:prstGeom prst="rect">
@@ -3225,7 +3225,7 @@
         </p:nvSpPr>
         <p:spPr>
           <a:xfrm>
-            <a:off x="4488225" y="4434027"/>
+            <a:off x="4505003" y="4492750"/>
             <a:ext cx="1371600" cy="1371600"/>
           </a:xfrm>
           <a:prstGeom prst="rect">
@@ -3562,7 +3562,7 @@
         </p:nvSpPr>
         <p:spPr>
           <a:xfrm>
-            <a:off x="3237244" y="2280702"/>
+            <a:off x="3254022" y="2339425"/>
             <a:ext cx="1371600" cy="1371600"/>
           </a:xfrm>
           <a:prstGeom prst="rect">
@@ -3619,7 +3619,7 @@
         </p:nvSpPr>
         <p:spPr>
           <a:xfrm>
-            <a:off x="4488225" y="3001115"/>
+            <a:off x="4505003" y="3059838"/>
             <a:ext cx="1371600" cy="1371600"/>
           </a:xfrm>
           <a:prstGeom prst="rect">
@@ -3756,7 +3756,9 @@
           </a:prstGeom>
           <a:ln w="25400">
             <a:solidFill>
-              <a:schemeClr val="tx1"/>
+              <a:schemeClr val="bg2">
+                <a:lumMod val="50000"/>
+              </a:schemeClr>
             </a:solidFill>
             <a:tailEnd type="triangle" w="lg" len="med"/>
           </a:ln>
@@ -3784,7 +3786,7 @@
         </p:nvCxnSpPr>
         <p:spPr>
           <a:xfrm flipV="1">
-            <a:off x="9216511" y="282257"/>
+            <a:off x="9142413" y="317782"/>
             <a:ext cx="0" cy="3657600"/>
           </a:xfrm>
           <a:prstGeom prst="straightConnector1">
@@ -3792,7 +3794,9 @@
           </a:prstGeom>
           <a:ln w="25400">
             <a:solidFill>
-              <a:schemeClr val="tx1"/>
+              <a:schemeClr val="bg2">
+                <a:lumMod val="50000"/>
+              </a:schemeClr>
             </a:solidFill>
             <a:tailEnd type="triangle" w="lg" len="med"/>
           </a:ln>

</xml_diff>